<commit_message>
Adjusted death rate by age
</commit_message>
<xml_diff>
--- a/Folder4/Final_Presentation.pptx
+++ b/Folder4/Final_Presentation.pptx
@@ -272,7 +272,7 @@
           <a:p>
             <a:fld id="{8BE9BC1A-C169-4E52-B4D1-E3FCE31958F7}" type="datetimeFigureOut">
               <a:rPr lang="en-US" smtClean="0"/>
-              <a:t>5/6/2021</a:t>
+              <a:t>5/7/2021</a:t>
             </a:fld>
             <a:endParaRPr lang="en-US"/>
           </a:p>
@@ -470,7 +470,7 @@
           <a:p>
             <a:fld id="{8BE9BC1A-C169-4E52-B4D1-E3FCE31958F7}" type="datetimeFigureOut">
               <a:rPr lang="en-US" smtClean="0"/>
-              <a:t>5/6/2021</a:t>
+              <a:t>5/7/2021</a:t>
             </a:fld>
             <a:endParaRPr lang="en-US"/>
           </a:p>
@@ -678,7 +678,7 @@
           <a:p>
             <a:fld id="{8BE9BC1A-C169-4E52-B4D1-E3FCE31958F7}" type="datetimeFigureOut">
               <a:rPr lang="en-US" smtClean="0"/>
-              <a:t>5/6/2021</a:t>
+              <a:t>5/7/2021</a:t>
             </a:fld>
             <a:endParaRPr lang="en-US"/>
           </a:p>
@@ -876,7 +876,7 @@
           <a:p>
             <a:fld id="{8BE9BC1A-C169-4E52-B4D1-E3FCE31958F7}" type="datetimeFigureOut">
               <a:rPr lang="en-US" smtClean="0"/>
-              <a:t>5/6/2021</a:t>
+              <a:t>5/7/2021</a:t>
             </a:fld>
             <a:endParaRPr lang="en-US"/>
           </a:p>
@@ -1151,7 +1151,7 @@
           <a:p>
             <a:fld id="{8BE9BC1A-C169-4E52-B4D1-E3FCE31958F7}" type="datetimeFigureOut">
               <a:rPr lang="en-US" smtClean="0"/>
-              <a:t>5/6/2021</a:t>
+              <a:t>5/7/2021</a:t>
             </a:fld>
             <a:endParaRPr lang="en-US"/>
           </a:p>
@@ -1416,7 +1416,7 @@
           <a:p>
             <a:fld id="{8BE9BC1A-C169-4E52-B4D1-E3FCE31958F7}" type="datetimeFigureOut">
               <a:rPr lang="en-US" smtClean="0"/>
-              <a:t>5/6/2021</a:t>
+              <a:t>5/7/2021</a:t>
             </a:fld>
             <a:endParaRPr lang="en-US"/>
           </a:p>
@@ -1828,7 +1828,7 @@
           <a:p>
             <a:fld id="{8BE9BC1A-C169-4E52-B4D1-E3FCE31958F7}" type="datetimeFigureOut">
               <a:rPr lang="en-US" smtClean="0"/>
-              <a:t>5/6/2021</a:t>
+              <a:t>5/7/2021</a:t>
             </a:fld>
             <a:endParaRPr lang="en-US"/>
           </a:p>
@@ -1969,7 +1969,7 @@
           <a:p>
             <a:fld id="{8BE9BC1A-C169-4E52-B4D1-E3FCE31958F7}" type="datetimeFigureOut">
               <a:rPr lang="en-US" smtClean="0"/>
-              <a:t>5/6/2021</a:t>
+              <a:t>5/7/2021</a:t>
             </a:fld>
             <a:endParaRPr lang="en-US"/>
           </a:p>
@@ -2082,7 +2082,7 @@
           <a:p>
             <a:fld id="{8BE9BC1A-C169-4E52-B4D1-E3FCE31958F7}" type="datetimeFigureOut">
               <a:rPr lang="en-US" smtClean="0"/>
-              <a:t>5/6/2021</a:t>
+              <a:t>5/7/2021</a:t>
             </a:fld>
             <a:endParaRPr lang="en-US"/>
           </a:p>
@@ -2393,7 +2393,7 @@
           <a:p>
             <a:fld id="{8BE9BC1A-C169-4E52-B4D1-E3FCE31958F7}" type="datetimeFigureOut">
               <a:rPr lang="en-US" smtClean="0"/>
-              <a:t>5/6/2021</a:t>
+              <a:t>5/7/2021</a:t>
             </a:fld>
             <a:endParaRPr lang="en-US"/>
           </a:p>
@@ -2681,7 +2681,7 @@
           <a:p>
             <a:fld id="{8BE9BC1A-C169-4E52-B4D1-E3FCE31958F7}" type="datetimeFigureOut">
               <a:rPr lang="en-US" smtClean="0"/>
-              <a:t>5/6/2021</a:t>
+              <a:t>5/7/2021</a:t>
             </a:fld>
             <a:endParaRPr lang="en-US"/>
           </a:p>
@@ -2922,7 +2922,7 @@
           <a:p>
             <a:fld id="{8BE9BC1A-C169-4E52-B4D1-E3FCE31958F7}" type="datetimeFigureOut">
               <a:rPr lang="en-US" smtClean="0"/>
-              <a:t>5/6/2021</a:t>
+              <a:t>5/7/2021</a:t>
             </a:fld>
             <a:endParaRPr lang="en-US"/>
           </a:p>
@@ -3355,12 +3355,21 @@
             <p:ph type="ctrTitle"/>
           </p:nvPr>
         </p:nvSpPr>
-        <p:spPr/>
-        <p:txBody>
-          <a:bodyPr/>
-          <a:lstStyle/>
-          <a:p>
-            <a:endParaRPr lang="en-US"/>
+        <p:spPr>
+          <a:xfrm>
+            <a:off x="1524000" y="1122364"/>
+            <a:ext cx="4308629" cy="999400"/>
+          </a:xfrm>
+        </p:spPr>
+        <p:txBody>
+          <a:bodyPr/>
+          <a:lstStyle/>
+          <a:p>
+            <a:pPr algn="l"/>
+            <a:r>
+              <a:rPr lang="en-US" b="1" dirty="0"/>
+              <a:t>Group 2</a:t>
+            </a:r>
           </a:p>
         </p:txBody>
       </p:sp>
@@ -3382,10 +3391,108 @@
         </p:nvSpPr>
         <p:spPr/>
         <p:txBody>
-          <a:bodyPr/>
-          <a:lstStyle/>
-          <a:p>
-            <a:endParaRPr lang="en-US"/>
+          <a:bodyPr>
+            <a:normAutofit lnSpcReduction="10000"/>
+          </a:bodyPr>
+          <a:lstStyle/>
+          <a:p>
+            <a:pPr algn="l"/>
+            <a:r>
+              <a:rPr lang="en-US" u="sng" dirty="0"/>
+              <a:t>Research Question: </a:t>
+            </a:r>
+          </a:p>
+          <a:p>
+            <a:pPr algn="l"/>
+            <a:endParaRPr lang="en-US" dirty="0"/>
+          </a:p>
+          <a:p>
+            <a:pPr algn="l"/>
+            <a:r>
+              <a:rPr lang="en-US" dirty="0"/>
+              <a:t>Which US states have managed the Covid-19 pandemic the best and which the worst? What factors may have affected their performance?</a:t>
+            </a:r>
+          </a:p>
+        </p:txBody>
+      </p:sp>
+      <p:sp>
+        <p:nvSpPr>
+          <p:cNvPr id="4" name="Title 1">
+            <a:extLst>
+              <a:ext uri="{FF2B5EF4-FFF2-40B4-BE49-F238E27FC236}">
+                <a16:creationId xmlns:a16="http://schemas.microsoft.com/office/drawing/2014/main" id="{B6D82D05-236C-4171-843D-79AA3A77847C}"/>
+              </a:ext>
+            </a:extLst>
+          </p:cNvPr>
+          <p:cNvSpPr txBox="1">
+            <a:spLocks/>
+          </p:cNvSpPr>
+          <p:nvPr/>
+        </p:nvSpPr>
+        <p:spPr>
+          <a:xfrm>
+            <a:off x="5937682" y="1122363"/>
+            <a:ext cx="4308629" cy="1655762"/>
+          </a:xfrm>
+          <a:prstGeom prst="rect">
+            <a:avLst/>
+          </a:prstGeom>
+        </p:spPr>
+        <p:txBody>
+          <a:bodyPr vert="horz" lIns="91440" tIns="45720" rIns="91440" bIns="45720" rtlCol="0" anchor="b">
+            <a:normAutofit/>
+          </a:bodyPr>
+          <a:lstStyle>
+            <a:lvl1pPr algn="ctr" defTabSz="914400" rtl="0" eaLnBrk="1" latinLnBrk="0" hangingPunct="1">
+              <a:lnSpc>
+                <a:spcPct val="90000"/>
+              </a:lnSpc>
+              <a:spcBef>
+                <a:spcPct val="0"/>
+              </a:spcBef>
+              <a:buNone/>
+              <a:defRPr sz="6000" kern="1200">
+                <a:solidFill>
+                  <a:schemeClr val="tx1"/>
+                </a:solidFill>
+                <a:latin typeface="+mj-lt"/>
+                <a:ea typeface="+mj-ea"/>
+                <a:cs typeface="+mj-cs"/>
+              </a:defRPr>
+            </a:lvl1pPr>
+          </a:lstStyle>
+          <a:p>
+            <a:pPr algn="l"/>
+            <a:r>
+              <a:rPr lang="en-US" sz="2800" dirty="0"/>
+              <a:t>Mohamed Ismael</a:t>
+            </a:r>
+          </a:p>
+          <a:p>
+            <a:pPr algn="l"/>
+            <a:r>
+              <a:rPr lang="en-US" sz="2800" dirty="0"/>
+              <a:t>Pallavi </a:t>
+            </a:r>
+            <a:r>
+              <a:rPr lang="en-US" sz="2800" dirty="0" err="1"/>
+              <a:t>Umap</a:t>
+            </a:r>
+            <a:endParaRPr lang="en-US" sz="2800" dirty="0"/>
+          </a:p>
+          <a:p>
+            <a:pPr algn="l"/>
+            <a:r>
+              <a:rPr lang="en-US" sz="2800" dirty="0"/>
+              <a:t>Jennie Cinelli</a:t>
+            </a:r>
+          </a:p>
+          <a:p>
+            <a:pPr algn="l"/>
+            <a:r>
+              <a:rPr lang="en-US" sz="2800" dirty="0"/>
+              <a:t>John Russell</a:t>
+            </a:r>
           </a:p>
         </p:txBody>
       </p:sp>
@@ -4586,7 +4693,9 @@
         </p:nvSpPr>
         <p:spPr/>
         <p:txBody>
-          <a:bodyPr/>
+          <a:bodyPr>
+            <a:normAutofit/>
+          </a:bodyPr>
           <a:lstStyle/>
           <a:p>
             <a:r>
@@ -4597,10 +4706,9 @@
               <a:rPr lang="en-US" dirty="0"/>
             </a:br>
             <a:r>
-              <a:rPr lang="en-US" sz="3200" dirty="0"/>
-              <a:t>Are states reporting consistently? Does it affect the death rate?</a:t>
-            </a:r>
-            <a:endParaRPr lang="en-US" dirty="0"/>
+              <a:rPr lang="en-US" sz="2000" dirty="0"/>
+              <a:t>Excess deaths range from ~20% (NE) to ~100% (AK) higher than Covid-19. The discrepancy provides very weak or little explanation of death rate or there are stronger confounding  variables.</a:t>
+            </a:r>
           </a:p>
         </p:txBody>
       </p:sp>
@@ -4640,19 +4748,8 @@
           <a:p>
             <a:r>
               <a:rPr lang="en-US" sz="1200" dirty="0"/>
-              <a:t>Definitions of any terms or metrics:  Excess deaths are typically defined as the difference between the observed numbers of deaths in specific time periods and expected numbers of deaths in the same </a:t>
-            </a:r>
-            <a:r>
-              <a:rPr lang="en-US" sz="1200" b="0" i="0" dirty="0">
-                <a:solidFill>
-                  <a:srgbClr val="000000"/>
-                </a:solidFill>
-                <a:effectLst/>
-                <a:latin typeface="Open Sans" panose="020B0604020202020204" pitchFamily="34" charset="0"/>
-              </a:rPr>
-              <a:t>time periods.</a:t>
-            </a:r>
-            <a:endParaRPr lang="en-US" sz="1200" dirty="0"/>
+              <a:t>Definitions of any terms or metrics:  Excess deaths are typically defined as the difference between the observed numbers of deaths in specific time periods and expected numbers of deaths in the same time periods.</a:t>
+            </a:r>
           </a:p>
           <a:p>
             <a:r>
@@ -4663,7 +4760,7 @@
           <a:p>
             <a:r>
               <a:rPr lang="en-US" sz="1200" dirty="0"/>
-              <a:t>Omissions or filtering: </a:t>
+              <a:t>Omissions or filtering:  </a:t>
             </a:r>
           </a:p>
         </p:txBody>

</xml_diff>